<commit_message>
java 문제 1 done && 컴구 assginment1 done
</commit_message>
<xml_diff>
--- a/시스템 프로그래밍/Proxy 1-2/순서도.pptx
+++ b/시스템 프로그래밍/Proxy 1-2/순서도.pptx
@@ -105,6 +105,11 @@
       </a:defRPr>
     </a:lvl9pPr>
   </p:defaultTextStyle>
+  <p:extLst>
+    <p:ext uri="{EFAFB233-063F-42B5-8137-9DF3F51BA10A}">
+      <p15:sldGuideLst xmlns:p15="http://schemas.microsoft.com/office/powerpoint/2012/main"/>
+    </p:ext>
+  </p:extLst>
 </p:presentation>
 </file>
 
@@ -239,7 +244,7 @@
           <a:p>
             <a:fld id="{07586447-AB40-4E57-8CBB-65AE4FB1DA00}" type="datetimeFigureOut">
               <a:rPr lang="ko-KR" altLang="en-US" smtClean="0"/>
-              <a:t>2022-04-01</a:t>
+              <a:t>2022-04-06</a:t>
             </a:fld>
             <a:endParaRPr lang="ko-KR" altLang="en-US"/>
           </a:p>
@@ -409,7 +414,7 @@
           <a:p>
             <a:fld id="{07586447-AB40-4E57-8CBB-65AE4FB1DA00}" type="datetimeFigureOut">
               <a:rPr lang="ko-KR" altLang="en-US" smtClean="0"/>
-              <a:t>2022-04-01</a:t>
+              <a:t>2022-04-06</a:t>
             </a:fld>
             <a:endParaRPr lang="ko-KR" altLang="en-US"/>
           </a:p>
@@ -589,7 +594,7 @@
           <a:p>
             <a:fld id="{07586447-AB40-4E57-8CBB-65AE4FB1DA00}" type="datetimeFigureOut">
               <a:rPr lang="ko-KR" altLang="en-US" smtClean="0"/>
-              <a:t>2022-04-01</a:t>
+              <a:t>2022-04-06</a:t>
             </a:fld>
             <a:endParaRPr lang="ko-KR" altLang="en-US"/>
           </a:p>
@@ -759,7 +764,7 @@
           <a:p>
             <a:fld id="{07586447-AB40-4E57-8CBB-65AE4FB1DA00}" type="datetimeFigureOut">
               <a:rPr lang="ko-KR" altLang="en-US" smtClean="0"/>
-              <a:t>2022-04-01</a:t>
+              <a:t>2022-04-06</a:t>
             </a:fld>
             <a:endParaRPr lang="ko-KR" altLang="en-US"/>
           </a:p>
@@ -1003,7 +1008,7 @@
           <a:p>
             <a:fld id="{07586447-AB40-4E57-8CBB-65AE4FB1DA00}" type="datetimeFigureOut">
               <a:rPr lang="ko-KR" altLang="en-US" smtClean="0"/>
-              <a:t>2022-04-01</a:t>
+              <a:t>2022-04-06</a:t>
             </a:fld>
             <a:endParaRPr lang="ko-KR" altLang="en-US"/>
           </a:p>
@@ -1235,7 +1240,7 @@
           <a:p>
             <a:fld id="{07586447-AB40-4E57-8CBB-65AE4FB1DA00}" type="datetimeFigureOut">
               <a:rPr lang="ko-KR" altLang="en-US" smtClean="0"/>
-              <a:t>2022-04-01</a:t>
+              <a:t>2022-04-06</a:t>
             </a:fld>
             <a:endParaRPr lang="ko-KR" altLang="en-US"/>
           </a:p>
@@ -1602,7 +1607,7 @@
           <a:p>
             <a:fld id="{07586447-AB40-4E57-8CBB-65AE4FB1DA00}" type="datetimeFigureOut">
               <a:rPr lang="ko-KR" altLang="en-US" smtClean="0"/>
-              <a:t>2022-04-01</a:t>
+              <a:t>2022-04-06</a:t>
             </a:fld>
             <a:endParaRPr lang="ko-KR" altLang="en-US"/>
           </a:p>
@@ -1720,7 +1725,7 @@
           <a:p>
             <a:fld id="{07586447-AB40-4E57-8CBB-65AE4FB1DA00}" type="datetimeFigureOut">
               <a:rPr lang="ko-KR" altLang="en-US" smtClean="0"/>
-              <a:t>2022-04-01</a:t>
+              <a:t>2022-04-06</a:t>
             </a:fld>
             <a:endParaRPr lang="ko-KR" altLang="en-US"/>
           </a:p>
@@ -1815,7 +1820,7 @@
           <a:p>
             <a:fld id="{07586447-AB40-4E57-8CBB-65AE4FB1DA00}" type="datetimeFigureOut">
               <a:rPr lang="ko-KR" altLang="en-US" smtClean="0"/>
-              <a:t>2022-04-01</a:t>
+              <a:t>2022-04-06</a:t>
             </a:fld>
             <a:endParaRPr lang="ko-KR" altLang="en-US"/>
           </a:p>
@@ -2092,7 +2097,7 @@
           <a:p>
             <a:fld id="{07586447-AB40-4E57-8CBB-65AE4FB1DA00}" type="datetimeFigureOut">
               <a:rPr lang="ko-KR" altLang="en-US" smtClean="0"/>
-              <a:t>2022-04-01</a:t>
+              <a:t>2022-04-06</a:t>
             </a:fld>
             <a:endParaRPr lang="ko-KR" altLang="en-US"/>
           </a:p>
@@ -2349,7 +2354,7 @@
           <a:p>
             <a:fld id="{07586447-AB40-4E57-8CBB-65AE4FB1DA00}" type="datetimeFigureOut">
               <a:rPr lang="ko-KR" altLang="en-US" smtClean="0"/>
-              <a:t>2022-04-01</a:t>
+              <a:t>2022-04-06</a:t>
             </a:fld>
             <a:endParaRPr lang="ko-KR" altLang="en-US"/>
           </a:p>
@@ -2562,7 +2567,7 @@
           <a:p>
             <a:fld id="{07586447-AB40-4E57-8CBB-65AE4FB1DA00}" type="datetimeFigureOut">
               <a:rPr lang="ko-KR" altLang="en-US" smtClean="0"/>
-              <a:t>2022-04-01</a:t>
+              <a:t>2022-04-06</a:t>
             </a:fld>
             <a:endParaRPr lang="ko-KR" altLang="en-US"/>
           </a:p>
@@ -5847,6 +5852,302 @@
           </a:fontRef>
         </p:style>
       </p:cxnSp>
+      <p:sp>
+        <p:nvSpPr>
+          <p:cNvPr id="2" name="TextBox 1">
+            <a:extLst>
+              <a:ext uri="{FF2B5EF4-FFF2-40B4-BE49-F238E27FC236}">
+                <a16:creationId xmlns:a16="http://schemas.microsoft.com/office/drawing/2014/main" id="{D900EFE8-4C42-4DA9-B7DB-BBDF7034AFB7}"/>
+              </a:ext>
+            </a:extLst>
+          </p:cNvPr>
+          <p:cNvSpPr txBox="1"/>
+          <p:nvPr/>
+        </p:nvSpPr>
+        <p:spPr>
+          <a:xfrm>
+            <a:off x="3592102" y="5131033"/>
+            <a:ext cx="410690" cy="200055"/>
+          </a:xfrm>
+          <a:prstGeom prst="rect">
+            <a:avLst/>
+          </a:prstGeom>
+          <a:noFill/>
+        </p:spPr>
+        <p:txBody>
+          <a:bodyPr wrap="none" rtlCol="0">
+            <a:spAutoFit/>
+          </a:bodyPr>
+          <a:lstStyle/>
+          <a:p>
+            <a:r>
+              <a:rPr lang="en-US" altLang="ko-KR" sz="700" dirty="0"/>
+              <a:t>No </a:t>
+            </a:r>
+            <a:r>
+              <a:rPr lang="en-US" altLang="ko-KR" sz="700" dirty="0" err="1"/>
+              <a:t>dir</a:t>
+            </a:r>
+            <a:endParaRPr lang="ko-KR" altLang="en-US" sz="700" dirty="0"/>
+          </a:p>
+        </p:txBody>
+      </p:sp>
+      <p:sp>
+        <p:nvSpPr>
+          <p:cNvPr id="45" name="TextBox 44">
+            <a:extLst>
+              <a:ext uri="{FF2B5EF4-FFF2-40B4-BE49-F238E27FC236}">
+                <a16:creationId xmlns:a16="http://schemas.microsoft.com/office/drawing/2014/main" id="{91F13AB2-B3A7-48DB-986C-8477B41DAAEE}"/>
+              </a:ext>
+            </a:extLst>
+          </p:cNvPr>
+          <p:cNvSpPr txBox="1"/>
+          <p:nvPr/>
+        </p:nvSpPr>
+        <p:spPr>
+          <a:xfrm>
+            <a:off x="2944507" y="5461635"/>
+            <a:ext cx="428322" cy="200055"/>
+          </a:xfrm>
+          <a:prstGeom prst="rect">
+            <a:avLst/>
+          </a:prstGeom>
+          <a:noFill/>
+        </p:spPr>
+        <p:txBody>
+          <a:bodyPr wrap="none" rtlCol="0">
+            <a:spAutoFit/>
+          </a:bodyPr>
+          <a:lstStyle/>
+          <a:p>
+            <a:r>
+              <a:rPr lang="en-US" altLang="ko-KR" sz="700" dirty="0"/>
+              <a:t>Yes </a:t>
+            </a:r>
+            <a:r>
+              <a:rPr lang="en-US" altLang="ko-KR" sz="700" dirty="0" err="1"/>
+              <a:t>dir</a:t>
+            </a:r>
+            <a:endParaRPr lang="ko-KR" altLang="en-US" sz="700" dirty="0"/>
+          </a:p>
+        </p:txBody>
+      </p:sp>
+      <p:sp>
+        <p:nvSpPr>
+          <p:cNvPr id="47" name="TextBox 46">
+            <a:extLst>
+              <a:ext uri="{FF2B5EF4-FFF2-40B4-BE49-F238E27FC236}">
+                <a16:creationId xmlns:a16="http://schemas.microsoft.com/office/drawing/2014/main" id="{D219C6A9-306E-429A-8732-0CC3EA592B34}"/>
+              </a:ext>
+            </a:extLst>
+          </p:cNvPr>
+          <p:cNvSpPr txBox="1"/>
+          <p:nvPr/>
+        </p:nvSpPr>
+        <p:spPr>
+          <a:xfrm>
+            <a:off x="1843393" y="5698419"/>
+            <a:ext cx="535724" cy="200055"/>
+          </a:xfrm>
+          <a:prstGeom prst="rect">
+            <a:avLst/>
+          </a:prstGeom>
+          <a:noFill/>
+        </p:spPr>
+        <p:txBody>
+          <a:bodyPr wrap="none" rtlCol="0">
+            <a:spAutoFit/>
+          </a:bodyPr>
+          <a:lstStyle/>
+          <a:p>
+            <a:r>
+              <a:rPr lang="en-US" altLang="ko-KR" sz="700" dirty="0"/>
+              <a:t>No logfile</a:t>
+            </a:r>
+            <a:endParaRPr lang="ko-KR" altLang="en-US" sz="700" dirty="0"/>
+          </a:p>
+        </p:txBody>
+      </p:sp>
+      <p:sp>
+        <p:nvSpPr>
+          <p:cNvPr id="49" name="TextBox 48">
+            <a:extLst>
+              <a:ext uri="{FF2B5EF4-FFF2-40B4-BE49-F238E27FC236}">
+                <a16:creationId xmlns:a16="http://schemas.microsoft.com/office/drawing/2014/main" id="{1C6CFA8B-FA66-4BA9-89C8-30041827AA22}"/>
+              </a:ext>
+            </a:extLst>
+          </p:cNvPr>
+          <p:cNvSpPr txBox="1"/>
+          <p:nvPr/>
+        </p:nvSpPr>
+        <p:spPr>
+          <a:xfrm>
+            <a:off x="2944507" y="6027188"/>
+            <a:ext cx="550151" cy="200055"/>
+          </a:xfrm>
+          <a:prstGeom prst="rect">
+            <a:avLst/>
+          </a:prstGeom>
+          <a:noFill/>
+        </p:spPr>
+        <p:txBody>
+          <a:bodyPr wrap="none" rtlCol="0">
+            <a:spAutoFit/>
+          </a:bodyPr>
+          <a:lstStyle/>
+          <a:p>
+            <a:r>
+              <a:rPr lang="en-US" altLang="ko-KR" sz="700" dirty="0"/>
+              <a:t>yes logfile</a:t>
+            </a:r>
+            <a:endParaRPr lang="ko-KR" altLang="en-US" sz="700" dirty="0"/>
+          </a:p>
+        </p:txBody>
+      </p:sp>
+      <p:sp>
+        <p:nvSpPr>
+          <p:cNvPr id="50" name="TextBox 49">
+            <a:extLst>
+              <a:ext uri="{FF2B5EF4-FFF2-40B4-BE49-F238E27FC236}">
+                <a16:creationId xmlns:a16="http://schemas.microsoft.com/office/drawing/2014/main" id="{11BA36B3-24A7-4A99-AB6D-ACE16D730EE4}"/>
+              </a:ext>
+            </a:extLst>
+          </p:cNvPr>
+          <p:cNvSpPr txBox="1"/>
+          <p:nvPr/>
+        </p:nvSpPr>
+        <p:spPr>
+          <a:xfrm>
+            <a:off x="3544014" y="6234128"/>
+            <a:ext cx="442750" cy="200055"/>
+          </a:xfrm>
+          <a:prstGeom prst="rect">
+            <a:avLst/>
+          </a:prstGeom>
+          <a:noFill/>
+        </p:spPr>
+        <p:txBody>
+          <a:bodyPr wrap="none" rtlCol="0">
+            <a:spAutoFit/>
+          </a:bodyPr>
+          <a:lstStyle/>
+          <a:p>
+            <a:r>
+              <a:rPr lang="en-US" altLang="ko-KR" sz="700" dirty="0"/>
+              <a:t>No bye</a:t>
+            </a:r>
+            <a:endParaRPr lang="ko-KR" altLang="en-US" sz="700" dirty="0"/>
+          </a:p>
+        </p:txBody>
+      </p:sp>
+      <p:sp>
+        <p:nvSpPr>
+          <p:cNvPr id="51" name="TextBox 50">
+            <a:extLst>
+              <a:ext uri="{FF2B5EF4-FFF2-40B4-BE49-F238E27FC236}">
+                <a16:creationId xmlns:a16="http://schemas.microsoft.com/office/drawing/2014/main" id="{05167B5E-38E0-40DF-984E-B2F4F1759FA0}"/>
+              </a:ext>
+            </a:extLst>
+          </p:cNvPr>
+          <p:cNvSpPr txBox="1"/>
+          <p:nvPr/>
+        </p:nvSpPr>
+        <p:spPr>
+          <a:xfrm>
+            <a:off x="2944507" y="6571482"/>
+            <a:ext cx="457176" cy="200055"/>
+          </a:xfrm>
+          <a:prstGeom prst="rect">
+            <a:avLst/>
+          </a:prstGeom>
+          <a:noFill/>
+        </p:spPr>
+        <p:txBody>
+          <a:bodyPr wrap="none" rtlCol="0">
+            <a:spAutoFit/>
+          </a:bodyPr>
+          <a:lstStyle/>
+          <a:p>
+            <a:r>
+              <a:rPr lang="en-US" altLang="ko-KR" sz="700" dirty="0"/>
+              <a:t>yes bye</a:t>
+            </a:r>
+            <a:endParaRPr lang="ko-KR" altLang="en-US" sz="700" dirty="0"/>
+          </a:p>
+        </p:txBody>
+      </p:sp>
+      <p:sp>
+        <p:nvSpPr>
+          <p:cNvPr id="52" name="TextBox 51">
+            <a:extLst>
+              <a:ext uri="{FF2B5EF4-FFF2-40B4-BE49-F238E27FC236}">
+                <a16:creationId xmlns:a16="http://schemas.microsoft.com/office/drawing/2014/main" id="{6ED29940-D330-4A21-9D5C-A644A5A7305C}"/>
+              </a:ext>
+            </a:extLst>
+          </p:cNvPr>
+          <p:cNvSpPr txBox="1"/>
+          <p:nvPr/>
+        </p:nvSpPr>
+        <p:spPr>
+          <a:xfrm>
+            <a:off x="3603978" y="7280254"/>
+            <a:ext cx="367408" cy="200055"/>
+          </a:xfrm>
+          <a:prstGeom prst="rect">
+            <a:avLst/>
+          </a:prstGeom>
+          <a:noFill/>
+        </p:spPr>
+        <p:txBody>
+          <a:bodyPr wrap="none" rtlCol="0">
+            <a:spAutoFit/>
+          </a:bodyPr>
+          <a:lstStyle/>
+          <a:p>
+            <a:r>
+              <a:rPr lang="en-US" altLang="ko-KR" sz="700" dirty="0"/>
+              <a:t>MISS</a:t>
+            </a:r>
+            <a:endParaRPr lang="ko-KR" altLang="en-US" sz="700" dirty="0"/>
+          </a:p>
+        </p:txBody>
+      </p:sp>
+      <p:sp>
+        <p:nvSpPr>
+          <p:cNvPr id="53" name="TextBox 52">
+            <a:extLst>
+              <a:ext uri="{FF2B5EF4-FFF2-40B4-BE49-F238E27FC236}">
+                <a16:creationId xmlns:a16="http://schemas.microsoft.com/office/drawing/2014/main" id="{296317D9-9872-4CB1-98F9-EB410BA44B51}"/>
+              </a:ext>
+            </a:extLst>
+          </p:cNvPr>
+          <p:cNvSpPr txBox="1"/>
+          <p:nvPr/>
+        </p:nvSpPr>
+        <p:spPr>
+          <a:xfrm>
+            <a:off x="2962958" y="7615183"/>
+            <a:ext cx="306494" cy="200055"/>
+          </a:xfrm>
+          <a:prstGeom prst="rect">
+            <a:avLst/>
+          </a:prstGeom>
+          <a:noFill/>
+        </p:spPr>
+        <p:txBody>
+          <a:bodyPr wrap="none" rtlCol="0">
+            <a:spAutoFit/>
+          </a:bodyPr>
+          <a:lstStyle/>
+          <a:p>
+            <a:r>
+              <a:rPr lang="en-US" altLang="ko-KR" sz="700" dirty="0"/>
+              <a:t>HIT</a:t>
+            </a:r>
+            <a:endParaRPr lang="ko-KR" altLang="en-US" sz="700" dirty="0"/>
+          </a:p>
+        </p:txBody>
+      </p:sp>
     </p:spTree>
     <p:extLst>
       <p:ext uri="{BB962C8B-B14F-4D97-AF65-F5344CB8AC3E}">

</xml_diff>